<commit_message>
Vko 01 Tehtävä 03
</commit_message>
<xml_diff>
--- a/luennot/viikko01/Luentokalvot_01.pptx
+++ b/luennot/viikko01/Luentokalvot_01.pptx
@@ -112,6 +112,11 @@
       </a:defRPr>
     </a:lvl9pPr>
   </p:defaultTextStyle>
+  <p:extLst>
+    <p:ext uri="{EFAFB233-063F-42B5-8137-9DF3F51BA10A}">
+      <p15:sldGuideLst xmlns:p15="http://schemas.microsoft.com/office/powerpoint/2012/main"/>
+    </p:ext>
+  </p:extLst>
 </p:presentation>
 </file>
 
@@ -14540,6 +14545,39 @@
                 <a:latin typeface="Arial"/>
               </a:rPr>
               <a:t>molemmat on asennettava. Tähän keskitytään tämän viikon tehtävissä 1 ja 2.</a:t>
+            </a:r>
+          </a:p>
+          <a:p>
+            <a:pPr marL="216000" indent="-215640">
+              <a:lnSpc>
+                <a:spcPts val="2200"/>
+              </a:lnSpc>
+              <a:spcBef>
+                <a:spcPts val="799"/>
+              </a:spcBef>
+              <a:buClr>
+                <a:srgbClr val="8BADDC"/>
+              </a:buClr>
+              <a:buFont typeface="Wingdings" charset="2"/>
+              <a:buChar char=""/>
+            </a:pPr>
+            <a:r>
+              <a:rPr lang="fi-FI" sz="1660" spc="-1" dirty="0">
+                <a:solidFill>
+                  <a:srgbClr val="000000"/>
+                </a:solidFill>
+                <a:latin typeface="Arial"/>
+              </a:rPr>
+              <a:t>Tästä jatketaan eteenpäin asennetun SQL Server palvelimen alas ajamisen harjoittamisella </a:t>
+            </a:r>
+            <a:r>
+              <a:rPr lang="fi-FI" sz="1660" spc="-1">
+                <a:solidFill>
+                  <a:srgbClr val="000000"/>
+                </a:solidFill>
+                <a:latin typeface="Arial"/>
+              </a:rPr>
+              <a:t>sekä käynnistämisellä.</a:t>
             </a:r>
             <a:endParaRPr lang="en-FI" sz="1660" b="0" strike="noStrike" spc="-1" dirty="0">
               <a:solidFill>

</xml_diff>